<commit_message>
Update Chapter 2 – Working with Layout.pptx
</commit_message>
<xml_diff>
--- a/M35-HTML-CSS/Bootstrap/Chapter 2 – Working with Layout.pptx
+++ b/M35-HTML-CSS/Bootstrap/Chapter 2 – Working with Layout.pptx
@@ -240,7 +240,7 @@
       <inkml:brushProperty name="rasterOp" value="maskPen"/>
     </inkml:brush>
   </inkml:definitions>
-  <inkml:trace contextRef="#ctx0" brushRef="#br0">2778 10740,'25'0,"0"0,0 0,-1 0,26 0,0 0,24 0,0 0,26 25,98-25,0 0,1 0,74 0,24 0,1 0,0 0,-75 0,0 0,-24 0,24 25,-49 0,-50 0,-25-1,0 1,-49-25,-1 25,1-25,-1 25,1-25,0 25,-1-25,1 0,24 0,1 24,24-24,-25 0,1 0,-1 0,-24 0,24 0,-24 0,-1 0,-24 0,0 0,0 0,0 0,-1 0,1 0,0 0,0 0,0 0,24 0,1 0,-25 0,24 0,1 0,-25 0,-1-24,26-1,-25 25</inkml:trace>
+  <inkml:trace contextRef="#ctx0" brushRef="#br0">2778 10740,'25'0,"0"0,0 0,-1 0,26 0,0 0,24 0,0 0,26 27,98-27,0 0,1 0,74 0,24 0,1 0,0 0,-75 0,0 0,-24 0,24 27,-49-1,-50 1,-25-1,0 1,-49-27,-1 27,1-27,-1 26,1-26,0 27,-1-27,1 0,24 0,1 26,24-26,-25 0,1 0,-1 0,-24 0,24 0,-24 0,-1 0,-24 0,0 0,0 0,0 0,-1 0,1 0,0 0,0 0,0 0,24 0,1 0,-25 0,24 0,1 0,-25 0,-1-26,26-1,-25 27</inkml:trace>
 </inkml:ink>
 </file>
 
@@ -383,7 +383,7 @@
             <a:fld id="{524DC8F9-1DCD-4754-A44C-6EBB62BDA97B}" type="datetimeFigureOut">
               <a:rPr lang="en-US" smtClean="0"/>
               <a:pPr/>
-              <a:t>5/22/2020</a:t>
+              <a:t>5/27/2020</a:t>
             </a:fld>
             <a:endParaRPr lang="en-US"/>
           </a:p>
@@ -8578,8 +8578,8 @@
           </p:pic>
         </mc:Fallback>
       </mc:AlternateContent>
-      <mc:AlternateContent xmlns:mc="http://schemas.openxmlformats.org/markup-compatibility/2006" xmlns:p14="http://schemas.microsoft.com/office/powerpoint/2010/main">
-        <mc:Choice Requires="p14">
+      <mc:AlternateContent xmlns:mc="http://schemas.openxmlformats.org/markup-compatibility/2006">
+        <mc:Choice xmlns:p14="http://schemas.microsoft.com/office/powerpoint/2010/main" Requires="p14">
           <p:contentPart p14:bwMode="auto" r:id="rId5">
             <p14:nvContentPartPr>
               <p14:cNvPr id="3" name="Ink 2"/>
@@ -8588,11 +8588,11 @@
             </p14:nvContentPartPr>
             <p14:xfrm>
               <a:off x="1000080" y="3866400"/>
-              <a:ext cx="1884600" cy="89640"/>
+              <a:ext cx="1884600" cy="96000"/>
             </p14:xfrm>
           </p:contentPart>
         </mc:Choice>
-        <mc:Fallback xmlns="">
+        <mc:Fallback>
           <p:pic>
             <p:nvPicPr>
               <p:cNvPr id="3" name="Ink 2"/>
@@ -8607,8 +8607,8 @@
             </p:blipFill>
             <p:spPr>
               <a:xfrm>
-                <a:off x="984240" y="3803040"/>
-                <a:ext cx="1916280" cy="216720"/>
+                <a:off x="984240" y="3803119"/>
+                <a:ext cx="1916280" cy="222562"/>
               </a:xfrm>
               <a:prstGeom prst="rect">
                 <a:avLst/>
@@ -8878,7 +8878,7 @@
         </p:blipFill>
         <p:spPr bwMode="auto">
           <a:xfrm>
-            <a:off x="381000" y="1761067"/>
+            <a:off x="381000" y="1519857"/>
             <a:ext cx="8597430" cy="3962400"/>
           </a:xfrm>
           <a:prstGeom prst="rect">

</xml_diff>